<commit_message>
update report and presentation
</commit_message>
<xml_diff>
--- a/src/com/duykypaul/kltn/docs/TỰ ĐỘNG LẬP KẾ HOẠCH GIA CÔNG CẮT.pptx
+++ b/src/com/duykypaul/kltn/docs/TỰ ĐỘNG LẬP KẾ HOẠCH GIA CÔNG CẮT.pptx
@@ -243,7 +243,7 @@
           <a:p>
             <a:fld id="{FE5B4EDC-59C0-49C7-8ADA-5A781B329E02}" type="datetimeFigureOut">
               <a:rPr lang="en-US"/>
-              <a:t>6/13/2021</a:t>
+              <a:t>6/15/2021</a:t>
             </a:fld>
             <a:endParaRPr/>
           </a:p>
@@ -408,7 +408,7 @@
           <a:p>
             <a:fld id="{F2D8D46A-B586-417D-BFBD-8C8FE0AAF762}" type="datetimeFigureOut">
               <a:rPr lang="en-US"/>
-              <a:t>6/13/2021</a:t>
+              <a:t>6/15/2021</a:t>
             </a:fld>
             <a:endParaRPr/>
           </a:p>
@@ -3477,7 +3477,7 @@
           <a:p>
             <a:fld id="{05AE0484-0237-4D80-BC95-0C8D6071B344}" type="datetime1">
               <a:rPr lang="en-US" smtClean="0"/>
-              <a:t>6/13/2021</a:t>
+              <a:t>6/15/2021</a:t>
             </a:fld>
             <a:endParaRPr/>
           </a:p>
@@ -3667,7 +3667,7 @@
           <a:p>
             <a:fld id="{8C8237DD-9166-4319-9443-3DB67D67CB14}" type="datetime1">
               <a:rPr lang="en-US" smtClean="0"/>
-              <a:t>6/13/2021</a:t>
+              <a:t>6/15/2021</a:t>
             </a:fld>
             <a:endParaRPr/>
           </a:p>
@@ -3867,7 +3867,7 @@
           <a:p>
             <a:fld id="{F4AF2B96-79D9-4EAF-892E-9CA1B8523A0F}" type="datetime1">
               <a:rPr lang="en-US" smtClean="0"/>
-              <a:t>6/13/2021</a:t>
+              <a:t>6/15/2021</a:t>
             </a:fld>
             <a:endParaRPr/>
           </a:p>
@@ -4057,7 +4057,7 @@
           <a:p>
             <a:fld id="{98EDF72A-D8CA-4843-9FB5-BFAA23462BCB}" type="datetime1">
               <a:rPr lang="en-US" smtClean="0"/>
-              <a:t>6/13/2021</a:t>
+              <a:t>6/15/2021</a:t>
             </a:fld>
             <a:endParaRPr/>
           </a:p>
@@ -4481,7 +4481,7 @@
           <a:p>
             <a:fld id="{6FA33EFA-B4D7-47DD-8898-06C32A8E8A6F}" type="datetime1">
               <a:rPr lang="en-US" smtClean="0"/>
-              <a:t>6/13/2021</a:t>
+              <a:t>6/15/2021</a:t>
             </a:fld>
             <a:endParaRPr/>
           </a:p>
@@ -4777,7 +4777,7 @@
           <a:p>
             <a:fld id="{1614EF5B-22E3-491C-9734-29CD9B7D2CFF}" type="datetime1">
               <a:rPr lang="en-US" smtClean="0"/>
-              <a:t>6/13/2021</a:t>
+              <a:t>6/15/2021</a:t>
             </a:fld>
             <a:endParaRPr/>
           </a:p>
@@ -5225,7 +5225,7 @@
           <a:p>
             <a:fld id="{7843DEE8-DA7E-4B6A-96CB-7785E0197B7C}" type="datetime1">
               <a:rPr lang="en-US" smtClean="0"/>
-              <a:t>6/13/2021</a:t>
+              <a:t>6/15/2021</a:t>
             </a:fld>
             <a:endParaRPr/>
           </a:p>
@@ -5347,7 +5347,7 @@
           <a:p>
             <a:fld id="{C7A72359-6575-4468-BDA3-18B144C4206F}" type="datetime1">
               <a:rPr lang="en-US" smtClean="0"/>
-              <a:t>6/13/2021</a:t>
+              <a:t>6/15/2021</a:t>
             </a:fld>
             <a:endParaRPr/>
           </a:p>
@@ -5446,7 +5446,7 @@
           <a:p>
             <a:fld id="{8E7F01EE-22E0-488C-B4FB-D17ACE4E3328}" type="datetime1">
               <a:rPr lang="en-US" smtClean="0"/>
-              <a:t>6/13/2021</a:t>
+              <a:t>6/15/2021</a:t>
             </a:fld>
             <a:endParaRPr/>
           </a:p>
@@ -5737,7 +5737,7 @@
           <a:p>
             <a:fld id="{CF40F7D9-69E9-47DE-97B3-FDCEA4C300E8}" type="datetime1">
               <a:rPr lang="en-US" smtClean="0"/>
-              <a:t>6/13/2021</a:t>
+              <a:t>6/15/2021</a:t>
             </a:fld>
             <a:endParaRPr/>
           </a:p>
@@ -6017,7 +6017,7 @@
           <a:p>
             <a:fld id="{1BE1865E-E7AE-4B5B-B280-6D61B5B96C51}" type="datetime1">
               <a:rPr lang="en-US" smtClean="0"/>
-              <a:t>6/13/2021</a:t>
+              <a:t>6/15/2021</a:t>
             </a:fld>
             <a:endParaRPr/>
           </a:p>
@@ -6612,7 +6612,7 @@
           <a:p>
             <a:fld id="{3AA6D4E8-288E-4D5E-B486-21D0E4533958}" type="datetime1">
               <a:rPr lang="en-US" smtClean="0"/>
-              <a:t>6/13/2021</a:t>
+              <a:t>6/15/2021</a:t>
             </a:fld>
             <a:endParaRPr/>
           </a:p>
@@ -14475,148 +14475,26 @@
               <a:buClrTx/>
             </a:pPr>
             <a:r>
-              <a:rPr lang="en-US" sz="3000" err="1">
-                <a:solidFill>
-                  <a:schemeClr val="bg1"/>
-                </a:solidFill>
-              </a:rPr>
-              <a:t>Khóa</a:t>
-            </a:r>
-            <a:r>
               <a:rPr lang="en-US" sz="3000">
                 <a:solidFill>
                   <a:schemeClr val="bg1"/>
                 </a:solidFill>
               </a:rPr>
-              <a:t> </a:t>
-            </a:r>
-            <a:r>
-              <a:rPr lang="en-US" sz="3000" err="1">
-                <a:solidFill>
-                  <a:schemeClr val="bg1"/>
-                </a:solidFill>
-              </a:rPr>
-              <a:t>luận</a:t>
-            </a:r>
-            <a:r>
-              <a:rPr lang="en-US" sz="3000">
-                <a:solidFill>
-                  <a:schemeClr val="bg1"/>
-                </a:solidFill>
-              </a:rPr>
-              <a:t> </a:t>
-            </a:r>
-            <a:r>
-              <a:rPr lang="en-US" sz="3000" err="1">
-                <a:solidFill>
-                  <a:schemeClr val="bg1"/>
-                </a:solidFill>
-              </a:rPr>
-              <a:t>đã</a:t>
-            </a:r>
-            <a:r>
-              <a:rPr lang="en-US" sz="3000">
-                <a:solidFill>
-                  <a:schemeClr val="bg1"/>
-                </a:solidFill>
-              </a:rPr>
-              <a:t> </a:t>
-            </a:r>
-            <a:r>
-              <a:rPr lang="en-US" sz="3000" err="1">
-                <a:solidFill>
-                  <a:schemeClr val="bg1"/>
-                </a:solidFill>
-              </a:rPr>
-              <a:t>làm</a:t>
-            </a:r>
-            <a:r>
-              <a:rPr lang="en-US" sz="3000">
-                <a:solidFill>
-                  <a:schemeClr val="bg1"/>
-                </a:solidFill>
-              </a:rPr>
-              <a:t> </a:t>
-            </a:r>
-            <a:r>
-              <a:rPr lang="en-US" sz="3000" err="1">
-                <a:solidFill>
-                  <a:schemeClr val="bg1"/>
-                </a:solidFill>
-              </a:rPr>
-              <a:t>được</a:t>
-            </a:r>
-            <a:r>
-              <a:rPr lang="en-US" sz="3000">
-                <a:solidFill>
-                  <a:schemeClr val="bg1"/>
-                </a:solidFill>
-              </a:rPr>
-              <a:t> </a:t>
-            </a:r>
-            <a:r>
-              <a:rPr lang="en-US" sz="3000" err="1">
-                <a:solidFill>
-                  <a:schemeClr val="bg1"/>
-                </a:solidFill>
-              </a:rPr>
-              <a:t>gì</a:t>
-            </a:r>
-            <a:endParaRPr lang="en-US" sz="3000">
-              <a:solidFill>
-                <a:schemeClr val="bg1"/>
-              </a:solidFill>
-            </a:endParaRPr>
+              <a:t>Kết quả đạt được của khóa luận</a:t>
+            </a:r>
           </a:p>
           <a:p>
             <a:pPr>
               <a:buClrTx/>
             </a:pPr>
             <a:r>
-              <a:rPr lang="en-US" sz="3000" err="1">
-                <a:solidFill>
-                  <a:schemeClr val="bg1"/>
-                </a:solidFill>
-              </a:rPr>
-              <a:t>Kết</a:t>
-            </a:r>
-            <a:r>
               <a:rPr lang="en-US" sz="3000">
                 <a:solidFill>
                   <a:schemeClr val="bg1"/>
                 </a:solidFill>
               </a:rPr>
-              <a:t> quả </a:t>
-            </a:r>
-            <a:r>
-              <a:rPr lang="en-US" sz="3000" err="1">
-                <a:solidFill>
-                  <a:schemeClr val="bg1"/>
-                </a:solidFill>
-              </a:rPr>
-              <a:t>khóa</a:t>
-            </a:r>
-            <a:r>
-              <a:rPr lang="en-US" sz="3000">
-                <a:solidFill>
-                  <a:schemeClr val="bg1"/>
-                </a:solidFill>
-              </a:rPr>
-              <a:t> </a:t>
-            </a:r>
-            <a:r>
-              <a:rPr lang="en-US" sz="3000" err="1">
-                <a:solidFill>
-                  <a:schemeClr val="bg1"/>
-                </a:solidFill>
-              </a:rPr>
-              <a:t>luận</a:t>
-            </a:r>
-            <a:endParaRPr lang="en-US" sz="3000">
-              <a:solidFill>
-                <a:schemeClr val="bg1"/>
-              </a:solidFill>
-            </a:endParaRPr>
+              <a:t>Hướng phát triển trong tương lai</a:t>
+            </a:r>
           </a:p>
         </p:txBody>
       </p:sp>
@@ -17375,7 +17253,7 @@
                 <a:latin typeface="Times New Roman" panose="02020603050405020304" pitchFamily="18" charset="0"/>
                 <a:cs typeface="Times New Roman" panose="02020603050405020304" pitchFamily="18" charset="0"/>
               </a:rPr>
-              <a:t> hang </a:t>
+              <a:t> hàng </a:t>
             </a:r>
             <a:r>
               <a:rPr lang="en-US" sz="3000" err="1">
@@ -20282,6 +20160,15 @@
 </file>
 
 <file path=customXml/item1.xml><?xml version="1.0" encoding="utf-8"?>
+<?mso-contentType ?>
+<FormTemplates xmlns="http://schemas.microsoft.com/sharepoint/v3/contenttype/forms">
+  <Display>DocumentLibraryForm</Display>
+  <Edit>AssetEditForm</Edit>
+  <New>DocumentLibraryForm</New>
+</FormTemplates>
+</file>
+
+<file path=customXml/item2.xml><?xml version="1.0" encoding="utf-8"?>
 <ct:contentTypeSchema xmlns:ct="http://schemas.microsoft.com/office/2006/metadata/contentType" xmlns:ma="http://schemas.microsoft.com/office/2006/metadata/properties/metaAttributes" ct:_="" ma:_="" ma:contentTypeName="TemplateFile" ma:contentTypeID="0x0101006EDDDB5EE6D98C44930B742096920B300400F5B6D36B3EF94B4E9A635CDF2A18F5B8" ma:contentTypeVersion="72" ma:contentTypeDescription="Create a new document." ma:contentTypeScope="" ma:versionID="a23e56308344d904b51738559c3d67c9">
   <xsd:schema xmlns:xsd="http://www.w3.org/2001/XMLSchema" xmlns:xs="http://www.w3.org/2001/XMLSchema" xmlns:p="http://schemas.microsoft.com/office/2006/metadata/properties" xmlns:ns2="4873beb7-5857-4685-be1f-d57550cc96cc" targetNamespace="http://schemas.microsoft.com/office/2006/metadata/properties" ma:root="true" ma:fieldsID="cd0908cc4600e77bf5da051303e00c8d" ns2:_="">
     <xsd:import namespace="4873beb7-5857-4685-be1f-d57550cc96cc"/>
@@ -21321,15 +21208,6 @@
 </ct:contentTypeSchema>
 </file>
 
-<file path=customXml/item2.xml><?xml version="1.0" encoding="utf-8"?>
-<?mso-contentType ?>
-<FormTemplates xmlns="http://schemas.microsoft.com/sharepoint/v3/contenttype/forms">
-  <Display>DocumentLibraryForm</Display>
-  <Edit>AssetEditForm</Edit>
-  <New>DocumentLibraryForm</New>
-</FormTemplates>
-</file>
-
 <file path=customXml/item3.xml><?xml version="1.0" encoding="utf-8"?>
 <p:properties xmlns:p="http://schemas.microsoft.com/office/2006/metadata/properties" xmlns:xsi="http://www.w3.org/2001/XMLSchema-instance" xmlns:pc="http://schemas.microsoft.com/office/infopath/2007/PartnerControls">
   <documentManagement>
@@ -21467,6 +21345,14 @@
 </file>
 
 <file path=customXml/itemProps1.xml><?xml version="1.0" encoding="utf-8"?>
+<ds:datastoreItem xmlns:ds="http://schemas.openxmlformats.org/officeDocument/2006/customXml" ds:itemID="{3836F65B-1B07-41EE-A0E8-BC6EF3855225}">
+  <ds:schemaRefs>
+    <ds:schemaRef ds:uri="http://schemas.microsoft.com/sharepoint/v3/contenttype/forms"/>
+  </ds:schemaRefs>
+</ds:datastoreItem>
+</file>
+
+<file path=customXml/itemProps2.xml><?xml version="1.0" encoding="utf-8"?>
 <ds:datastoreItem xmlns:ds="http://schemas.openxmlformats.org/officeDocument/2006/customXml" ds:itemID="{A09BF4D4-EF60-4196-BFC3-9462D607978C}">
   <ds:schemaRefs>
     <ds:schemaRef ds:uri="http://schemas.microsoft.com/office/2006/metadata/contentType"/>
@@ -21480,14 +21366,6 @@
     <ds:schemaRef ds:uri="http://purl.org/dc/elements/1.1/"/>
     <ds:schemaRef ds:uri="http://purl.org/dc/terms/"/>
     <ds:schemaRef ds:uri="http://schemas.microsoft.com/internal/obd"/>
-  </ds:schemaRefs>
-</ds:datastoreItem>
-</file>
-
-<file path=customXml/itemProps2.xml><?xml version="1.0" encoding="utf-8"?>
-<ds:datastoreItem xmlns:ds="http://schemas.openxmlformats.org/officeDocument/2006/customXml" ds:itemID="{3836F65B-1B07-41EE-A0E8-BC6EF3855225}">
-  <ds:schemaRefs>
-    <ds:schemaRef ds:uri="http://schemas.microsoft.com/sharepoint/v3/contenttype/forms"/>
   </ds:schemaRefs>
 </ds:datastoreItem>
 </file>

</xml_diff>